<commit_message>
Added Node version of Azure Functions lab
</commit_message>
<xml_diff>
--- a/Content/Functions/Azure Functions.pptx
+++ b/Content/Functions/Azure Functions.pptx
@@ -219,7 +219,7 @@
           <a:p>
             <a:fld id="{2E5CA586-3557-4985-BCD4-35EF5AC8B4A4}" type="datetimeFigureOut">
               <a:rPr lang="en-US" smtClean="0"/>
-              <a:t>1/12/2017</a:t>
+              <a:t>3/7/2017</a:t>
             </a:fld>
             <a:endParaRPr lang="en-US"/>
           </a:p>
@@ -12275,35 +12275,35 @@
                 <a:gridCol w="3052332">
                   <a:extLst>
                     <a:ext uri="{9D8B030D-6E8A-4147-A177-3AD203B41FA5}">
-                      <a16:colId xmlns="" xmlns:a16="http://schemas.microsoft.com/office/drawing/2014/main" val="1381631012"/>
+                      <a16:colId xmlns:a16="http://schemas.microsoft.com/office/drawing/2014/main" xmlns="" val="1381631012"/>
                     </a:ext>
                   </a:extLst>
                 </a:gridCol>
                 <a:gridCol w="3418879">
                   <a:extLst>
                     <a:ext uri="{9D8B030D-6E8A-4147-A177-3AD203B41FA5}">
-                      <a16:colId xmlns="" xmlns:a16="http://schemas.microsoft.com/office/drawing/2014/main" val="268957825"/>
+                      <a16:colId xmlns:a16="http://schemas.microsoft.com/office/drawing/2014/main" xmlns="" val="268957825"/>
                     </a:ext>
                   </a:extLst>
                 </a:gridCol>
                 <a:gridCol w="1139627">
                   <a:extLst>
                     <a:ext uri="{9D8B030D-6E8A-4147-A177-3AD203B41FA5}">
-                      <a16:colId xmlns="" xmlns:a16="http://schemas.microsoft.com/office/drawing/2014/main" val="3697201972"/>
+                      <a16:colId xmlns:a16="http://schemas.microsoft.com/office/drawing/2014/main" xmlns="" val="3697201972"/>
                     </a:ext>
                   </a:extLst>
                 </a:gridCol>
                 <a:gridCol w="1349557">
                   <a:extLst>
                     <a:ext uri="{9D8B030D-6E8A-4147-A177-3AD203B41FA5}">
-                      <a16:colId xmlns="" xmlns:a16="http://schemas.microsoft.com/office/drawing/2014/main" val="1062125523"/>
+                      <a16:colId xmlns:a16="http://schemas.microsoft.com/office/drawing/2014/main" xmlns="" val="1062125523"/>
                     </a:ext>
                   </a:extLst>
                 </a:gridCol>
                 <a:gridCol w="1199606">
                   <a:extLst>
                     <a:ext uri="{9D8B030D-6E8A-4147-A177-3AD203B41FA5}">
-                      <a16:colId xmlns="" xmlns:a16="http://schemas.microsoft.com/office/drawing/2014/main" val="1149894302"/>
+                      <a16:colId xmlns:a16="http://schemas.microsoft.com/office/drawing/2014/main" xmlns="" val="1149894302"/>
                     </a:ext>
                   </a:extLst>
                 </a:gridCol>
@@ -12381,7 +12381,7 @@
                 </a:tc>
                 <a:extLst>
                   <a:ext uri="{0D108BD9-81ED-4DB2-BD59-A6C34878D82A}">
-                    <a16:rowId xmlns="" xmlns:a16="http://schemas.microsoft.com/office/drawing/2014/main" val="2204649050"/>
+                    <a16:rowId xmlns:a16="http://schemas.microsoft.com/office/drawing/2014/main" xmlns="" val="2204649050"/>
                   </a:ext>
                 </a:extLst>
               </a:tr>
@@ -12450,7 +12450,7 @@
                 </a:tc>
                 <a:extLst>
                   <a:ext uri="{0D108BD9-81ED-4DB2-BD59-A6C34878D82A}">
-                    <a16:rowId xmlns="" xmlns:a16="http://schemas.microsoft.com/office/drawing/2014/main" val="4239000174"/>
+                    <a16:rowId xmlns:a16="http://schemas.microsoft.com/office/drawing/2014/main" xmlns="" val="4239000174"/>
                   </a:ext>
                 </a:extLst>
               </a:tr>
@@ -12530,7 +12530,7 @@
                 </a:tc>
                 <a:extLst>
                   <a:ext uri="{0D108BD9-81ED-4DB2-BD59-A6C34878D82A}">
-                    <a16:rowId xmlns="" xmlns:a16="http://schemas.microsoft.com/office/drawing/2014/main" val="900705094"/>
+                    <a16:rowId xmlns:a16="http://schemas.microsoft.com/office/drawing/2014/main" xmlns="" val="900705094"/>
                   </a:ext>
                 </a:extLst>
               </a:tr>
@@ -12605,7 +12605,7 @@
                 </a:tc>
                 <a:extLst>
                   <a:ext uri="{0D108BD9-81ED-4DB2-BD59-A6C34878D82A}">
-                    <a16:rowId xmlns="" xmlns:a16="http://schemas.microsoft.com/office/drawing/2014/main" val="671749842"/>
+                    <a16:rowId xmlns:a16="http://schemas.microsoft.com/office/drawing/2014/main" xmlns="" val="671749842"/>
                   </a:ext>
                 </a:extLst>
               </a:tr>
@@ -12677,7 +12677,7 @@
                 </a:tc>
                 <a:extLst>
                   <a:ext uri="{0D108BD9-81ED-4DB2-BD59-A6C34878D82A}">
-                    <a16:rowId xmlns="" xmlns:a16="http://schemas.microsoft.com/office/drawing/2014/main" val="1468464882"/>
+                    <a16:rowId xmlns:a16="http://schemas.microsoft.com/office/drawing/2014/main" xmlns="" val="1468464882"/>
                   </a:ext>
                 </a:extLst>
               </a:tr>
@@ -12749,7 +12749,7 @@
                 </a:tc>
                 <a:extLst>
                   <a:ext uri="{0D108BD9-81ED-4DB2-BD59-A6C34878D82A}">
-                    <a16:rowId xmlns="" xmlns:a16="http://schemas.microsoft.com/office/drawing/2014/main" val="3075698797"/>
+                    <a16:rowId xmlns:a16="http://schemas.microsoft.com/office/drawing/2014/main" xmlns="" val="3075698797"/>
                   </a:ext>
                 </a:extLst>
               </a:tr>
@@ -12821,7 +12821,7 @@
                 </a:tc>
                 <a:extLst>
                   <a:ext uri="{0D108BD9-81ED-4DB2-BD59-A6C34878D82A}">
-                    <a16:rowId xmlns="" xmlns:a16="http://schemas.microsoft.com/office/drawing/2014/main" val="1916531532"/>
+                    <a16:rowId xmlns:a16="http://schemas.microsoft.com/office/drawing/2014/main" xmlns="" val="1916531532"/>
                   </a:ext>
                 </a:extLst>
               </a:tr>
@@ -12893,7 +12893,7 @@
                 </a:tc>
                 <a:extLst>
                   <a:ext uri="{0D108BD9-81ED-4DB2-BD59-A6C34878D82A}">
-                    <a16:rowId xmlns="" xmlns:a16="http://schemas.microsoft.com/office/drawing/2014/main" val="2601799188"/>
+                    <a16:rowId xmlns:a16="http://schemas.microsoft.com/office/drawing/2014/main" xmlns="" val="2601799188"/>
                   </a:ext>
                 </a:extLst>
               </a:tr>
@@ -12969,7 +12969,7 @@
                 </a:tc>
                 <a:extLst>
                   <a:ext uri="{0D108BD9-81ED-4DB2-BD59-A6C34878D82A}">
-                    <a16:rowId xmlns="" xmlns:a16="http://schemas.microsoft.com/office/drawing/2014/main" val="1761236402"/>
+                    <a16:rowId xmlns:a16="http://schemas.microsoft.com/office/drawing/2014/main" xmlns="" val="1761236402"/>
                   </a:ext>
                 </a:extLst>
               </a:tr>
@@ -13038,7 +13038,7 @@
                 </a:tc>
                 <a:extLst>
                   <a:ext uri="{0D108BD9-81ED-4DB2-BD59-A6C34878D82A}">
-                    <a16:rowId xmlns="" xmlns:a16="http://schemas.microsoft.com/office/drawing/2014/main" val="1542988016"/>
+                    <a16:rowId xmlns:a16="http://schemas.microsoft.com/office/drawing/2014/main" xmlns="" val="1542988016"/>
                   </a:ext>
                 </a:extLst>
               </a:tr>
@@ -13067,7 +13067,7 @@
         </p:spPr>
         <p:txBody>
           <a:bodyPr>
-            <a:normAutofit fontScale="92500" lnSpcReduction="20000"/>
+            <a:normAutofit fontScale="92500" lnSpcReduction="10000"/>
           </a:bodyPr>
           <a:lstStyle/>
           <a:p>
@@ -13156,8 +13156,8 @@
         </p:nvSpPr>
         <p:spPr>
           <a:xfrm>
-            <a:off x="1889617" y="5630475"/>
-            <a:ext cx="8800154" cy="461665"/>
+            <a:off x="1889616" y="5630475"/>
+            <a:ext cx="9540383" cy="461665"/>
           </a:xfrm>
         </p:spPr>
         <p:txBody>
@@ -13170,7 +13170,19 @@
             </a:r>
             <a:r>
               <a:rPr lang="en-US" dirty="0" smtClean="0"/>
-              <a:t>HOL.html</a:t>
+              <a:t>HOL (C#).html </a:t>
+            </a:r>
+            <a:r>
+              <a:rPr lang="en-US" dirty="0"/>
+              <a:t>or Azure Functions HOL </a:t>
+            </a:r>
+            <a:r>
+              <a:rPr lang="en-US" dirty="0" smtClean="0"/>
+              <a:t>(Node).</a:t>
+            </a:r>
+            <a:r>
+              <a:rPr lang="en-US" dirty="0"/>
+              <a:t>html</a:t>
             </a:r>
             <a:endParaRPr lang="en-US" dirty="0"/>
           </a:p>
@@ -13198,11 +13210,7 @@
           <a:p>
             <a:r>
               <a:rPr lang="en-US" dirty="0" smtClean="0"/>
-              <a:t>Azure </a:t>
-            </a:r>
-            <a:r>
-              <a:rPr lang="en-US" dirty="0" smtClean="0"/>
-              <a:t>Functions</a:t>
+              <a:t>Azure Functions</a:t>
             </a:r>
             <a:endParaRPr lang="en-US" dirty="0"/>
           </a:p>
@@ -13545,7 +13553,7 @@
         </p:spPr>
         <p:txBody>
           <a:bodyPr>
-            <a:normAutofit fontScale="85000" lnSpcReduction="10000"/>
+            <a:normAutofit fontScale="92500" lnSpcReduction="10000"/>
           </a:bodyPr>
           <a:lstStyle/>
           <a:p>
@@ -13586,11 +13594,7 @@
             </a:r>
             <a:r>
               <a:rPr lang="en-US" dirty="0" smtClean="0"/>
-              <a:t> </a:t>
-            </a:r>
-            <a:r>
-              <a:rPr lang="en-US" dirty="0" smtClean="0"/>
-              <a:t>systems</a:t>
+              <a:t> systems</a:t>
             </a:r>
             <a:endParaRPr lang="en-US" dirty="0"/>
           </a:p>
@@ -15172,7 +15176,7 @@
         </p:spPr>
         <p:txBody>
           <a:bodyPr>
-            <a:normAutofit fontScale="92500" lnSpcReduction="10000"/>
+            <a:normAutofit lnSpcReduction="10000"/>
           </a:bodyPr>
           <a:lstStyle/>
           <a:p>

</xml_diff>